<commit_message>
Cambios sustentación 2 trimestre
</commit_message>
<xml_diff>
--- a/2.Analisis/Presentacion2tri.pptx
+++ b/2.Analisis/Presentacion2tri.pptx
@@ -5,7 +5,7 @@
     <p:sldMasterId id="2147483648" r:id="rId1"/>
   </p:sldMasterIdLst>
   <p:notesMasterIdLst>
-    <p:notesMasterId r:id="rId22"/>
+    <p:notesMasterId r:id="rId23"/>
   </p:notesMasterIdLst>
   <p:sldIdLst>
     <p:sldId id="256" r:id="rId2"/>
@@ -13,21 +13,22 @@
     <p:sldId id="367" r:id="rId4"/>
     <p:sldId id="368" r:id="rId5"/>
     <p:sldId id="369" r:id="rId6"/>
-    <p:sldId id="370" r:id="rId7"/>
-    <p:sldId id="371" r:id="rId8"/>
-    <p:sldId id="372" r:id="rId9"/>
-    <p:sldId id="373" r:id="rId10"/>
-    <p:sldId id="374" r:id="rId11"/>
-    <p:sldId id="375" r:id="rId12"/>
-    <p:sldId id="376" r:id="rId13"/>
-    <p:sldId id="377" r:id="rId14"/>
-    <p:sldId id="378" r:id="rId15"/>
-    <p:sldId id="380" r:id="rId16"/>
-    <p:sldId id="379" r:id="rId17"/>
-    <p:sldId id="340" r:id="rId18"/>
-    <p:sldId id="365" r:id="rId19"/>
-    <p:sldId id="325" r:id="rId20"/>
-    <p:sldId id="308" r:id="rId21"/>
+    <p:sldId id="381" r:id="rId7"/>
+    <p:sldId id="370" r:id="rId8"/>
+    <p:sldId id="371" r:id="rId9"/>
+    <p:sldId id="372" r:id="rId10"/>
+    <p:sldId id="373" r:id="rId11"/>
+    <p:sldId id="374" r:id="rId12"/>
+    <p:sldId id="375" r:id="rId13"/>
+    <p:sldId id="376" r:id="rId14"/>
+    <p:sldId id="377" r:id="rId15"/>
+    <p:sldId id="378" r:id="rId16"/>
+    <p:sldId id="380" r:id="rId17"/>
+    <p:sldId id="379" r:id="rId18"/>
+    <p:sldId id="340" r:id="rId19"/>
+    <p:sldId id="365" r:id="rId20"/>
+    <p:sldId id="325" r:id="rId21"/>
+    <p:sldId id="308" r:id="rId22"/>
   </p:sldIdLst>
   <p:sldSz cx="24384000" cy="15748000"/>
   <p:notesSz cx="6858000" cy="9144000"/>
@@ -2660,6 +2661,275 @@
                 <a:latin typeface="Calibri" panose="020F0502020204030204" pitchFamily="34" charset="0"/>
                 <a:sym typeface="Helvetica Neue"/>
               </a:rPr>
+              <a:t>Diccionario de datos</a:t>
+            </a:r>
+          </a:p>
+        </p:txBody>
+      </p:sp>
+      <p:sp>
+        <p:nvSpPr>
+          <p:cNvPr id="5" name="CuadroTexto 4">
+            <a:extLst>
+              <a:ext uri="{FF2B5EF4-FFF2-40B4-BE49-F238E27FC236}">
+                <a16:creationId xmlns:a16="http://schemas.microsoft.com/office/drawing/2014/main" id="{770693C3-94C8-4AFE-AC3D-15002080B156}"/>
+              </a:ext>
+            </a:extLst>
+          </p:cNvPr>
+          <p:cNvSpPr txBox="1"/>
+          <p:nvPr/>
+        </p:nvSpPr>
+        <p:spPr>
+          <a:xfrm>
+            <a:off x="9490940" y="7175733"/>
+            <a:ext cx="5402120" cy="698267"/>
+          </a:xfrm>
+          <a:prstGeom prst="rect">
+            <a:avLst/>
+          </a:prstGeom>
+          <a:noFill/>
+          <a:ln w="12700" cap="flat">
+            <a:noFill/>
+            <a:miter lim="400000"/>
+          </a:ln>
+          <a:effectLst/>
+          <a:sp3d/>
+        </p:spPr>
+        <p:style>
+          <a:lnRef idx="0">
+            <a:scrgbClr r="0" g="0" b="0"/>
+          </a:lnRef>
+          <a:fillRef idx="0">
+            <a:scrgbClr r="0" g="0" b="0"/>
+          </a:fillRef>
+          <a:effectRef idx="0">
+            <a:scrgbClr r="0" g="0" b="0"/>
+          </a:effectRef>
+          <a:fontRef idx="none"/>
+        </p:style>
+        <p:txBody>
+          <a:bodyPr rot="0" spcFirstLastPara="1" vertOverflow="overflow" horzOverflow="overflow" vert="horz" wrap="none" lIns="71437" tIns="71437" rIns="71437" bIns="71437" numCol="1" spcCol="38100" rtlCol="0" anchor="ctr">
+            <a:spAutoFit/>
+          </a:bodyPr>
+          <a:lstStyle/>
+          <a:p>
+            <a:pPr marL="0" marR="0" indent="0" algn="ctr" defTabSz="943239" rtl="0" fontAlgn="auto" latinLnBrk="0" hangingPunct="0">
+              <a:lnSpc>
+                <a:spcPct val="100000"/>
+              </a:lnSpc>
+              <a:spcBef>
+                <a:spcPts val="0"/>
+              </a:spcBef>
+              <a:spcAft>
+                <a:spcPts val="0"/>
+              </a:spcAft>
+              <a:buClrTx/>
+              <a:buSzTx/>
+              <a:buFontTx/>
+              <a:buNone/>
+              <a:tabLst/>
+            </a:pPr>
+            <a:r>
+              <a:rPr kumimoji="0" lang="es-CO" sz="3600" i="0" strike="noStrike" cap="none" spc="0" normalizeH="0" baseline="0" dirty="0">
+                <a:ln>
+                  <a:noFill/>
+                </a:ln>
+                <a:solidFill>
+                  <a:schemeClr val="bg1">
+                    <a:lumMod val="85000"/>
+                    <a:lumOff val="15000"/>
+                  </a:schemeClr>
+                </a:solidFill>
+                <a:effectLst/>
+                <a:uFillTx/>
+                <a:latin typeface="Helvetica Neue"/>
+                <a:ea typeface="Helvetica Neue"/>
+                <a:cs typeface="Helvetica Neue"/>
+                <a:sym typeface="Helvetica Neue"/>
+                <a:hlinkClick r:id="rId3" action="ppaction://hlinkfile">
+                  <a:extLst>
+                    <a:ext uri="{A12FA001-AC4F-418D-AE19-62706E023703}">
+                      <ahyp:hlinkClr xmlns:ahyp="http://schemas.microsoft.com/office/drawing/2018/hyperlinkcolor" val="tx"/>
+                    </a:ext>
+                  </a:extLst>
+                </a:hlinkClick>
+              </a:rPr>
+              <a:t>Click para abrir archivo.</a:t>
+            </a:r>
+            <a:endParaRPr kumimoji="0" lang="es-CO" sz="3600" i="0" strike="noStrike" cap="none" spc="0" normalizeH="0" baseline="0" dirty="0">
+              <a:ln>
+                <a:noFill/>
+              </a:ln>
+              <a:solidFill>
+                <a:schemeClr val="bg1">
+                  <a:lumMod val="85000"/>
+                  <a:lumOff val="15000"/>
+                </a:schemeClr>
+              </a:solidFill>
+              <a:effectLst/>
+              <a:uFillTx/>
+              <a:latin typeface="Helvetica Neue"/>
+              <a:ea typeface="Helvetica Neue"/>
+              <a:cs typeface="Helvetica Neue"/>
+              <a:sym typeface="Helvetica Neue"/>
+            </a:endParaRPr>
+          </a:p>
+        </p:txBody>
+      </p:sp>
+      <p:pic>
+        <p:nvPicPr>
+          <p:cNvPr id="4" name="Imagen 3">
+            <a:extLst>
+              <a:ext uri="{FF2B5EF4-FFF2-40B4-BE49-F238E27FC236}">
+                <a16:creationId xmlns:a16="http://schemas.microsoft.com/office/drawing/2014/main" id="{95C30589-D84F-43B0-861B-615AC36DED96}"/>
+              </a:ext>
+            </a:extLst>
+          </p:cNvPr>
+          <p:cNvPicPr>
+            <a:picLocks noChangeAspect="1"/>
+          </p:cNvPicPr>
+          <p:nvPr/>
+        </p:nvPicPr>
+        <p:blipFill rotWithShape="1">
+          <a:blip r:embed="rId4">
+            <a:extLst>
+              <a:ext uri="{28A0092B-C50C-407E-A947-70E740481C1C}">
+                <a14:useLocalDpi xmlns:a14="http://schemas.microsoft.com/office/drawing/2010/main" val="0"/>
+              </a:ext>
+            </a:extLst>
+          </a:blip>
+          <a:srcRect l="17941" t="43512" r="11589" b="39825"/>
+          <a:stretch/>
+        </p:blipFill>
+        <p:spPr>
+          <a:xfrm>
+            <a:off x="15727680" y="12210749"/>
+            <a:ext cx="6858000" cy="1621597"/>
+          </a:xfrm>
+          <a:prstGeom prst="rect">
+            <a:avLst/>
+          </a:prstGeom>
+        </p:spPr>
+      </p:pic>
+    </p:spTree>
+    <p:extLst>
+      <p:ext uri="{BB962C8B-B14F-4D97-AF65-F5344CB8AC3E}">
+        <p14:creationId xmlns:p14="http://schemas.microsoft.com/office/powerpoint/2010/main" val="2018473659"/>
+      </p:ext>
+    </p:extLst>
+  </p:cSld>
+  <p:clrMapOvr>
+    <a:masterClrMapping/>
+  </p:clrMapOvr>
+  <p:transition spd="med"/>
+</p:sld>
+</file>
+
+<file path=ppt/slides/slide11.xml><?xml version="1.0" encoding="utf-8"?>
+<p:sld xmlns:a="http://schemas.openxmlformats.org/drawingml/2006/main" xmlns:r="http://schemas.openxmlformats.org/officeDocument/2006/relationships" xmlns:p="http://schemas.openxmlformats.org/presentationml/2006/main">
+  <p:cSld>
+    <p:bg>
+      <p:bgPr>
+        <a:blipFill rotWithShape="1">
+          <a:blip r:embed="rId2"/>
+          <a:stretch>
+            <a:fillRect/>
+          </a:stretch>
+        </a:blipFill>
+        <a:effectLst/>
+      </p:bgPr>
+    </p:bg>
+    <p:spTree>
+      <p:nvGrpSpPr>
+        <p:cNvPr id="1" name=""/>
+        <p:cNvGrpSpPr/>
+        <p:nvPr/>
+      </p:nvGrpSpPr>
+      <p:grpSpPr>
+        <a:xfrm>
+          <a:off x="0" y="0"/>
+          <a:ext cx="0" cy="0"/>
+          <a:chOff x="0" y="0"/>
+          <a:chExt cx="0" cy="0"/>
+        </a:xfrm>
+      </p:grpSpPr>
+      <p:sp>
+        <p:nvSpPr>
+          <p:cNvPr id="2" name="CuadroTexto 1">
+            <a:extLst>
+              <a:ext uri="{FF2B5EF4-FFF2-40B4-BE49-F238E27FC236}">
+                <a16:creationId xmlns:a16="http://schemas.microsoft.com/office/drawing/2014/main" id="{A3132D1F-2B09-4536-8066-2A4F375B9D21}"/>
+              </a:ext>
+            </a:extLst>
+          </p:cNvPr>
+          <p:cNvSpPr txBox="1"/>
+          <p:nvPr/>
+        </p:nvSpPr>
+        <p:spPr>
+          <a:xfrm>
+            <a:off x="2255520" y="2414235"/>
+            <a:ext cx="19872960" cy="1621597"/>
+          </a:xfrm>
+          <a:prstGeom prst="rect">
+            <a:avLst/>
+          </a:prstGeom>
+          <a:noFill/>
+          <a:ln w="12700" cap="flat">
+            <a:noFill/>
+            <a:miter lim="400000"/>
+          </a:ln>
+          <a:effectLst/>
+          <a:sp3d/>
+        </p:spPr>
+        <p:style>
+          <a:lnRef idx="0">
+            <a:scrgbClr r="0" g="0" b="0"/>
+          </a:lnRef>
+          <a:fillRef idx="0">
+            <a:scrgbClr r="0" g="0" b="0"/>
+          </a:fillRef>
+          <a:effectRef idx="0">
+            <a:scrgbClr r="0" g="0" b="0"/>
+          </a:effectRef>
+          <a:fontRef idx="none"/>
+        </p:style>
+        <p:txBody>
+          <a:bodyPr rot="0" spcFirstLastPara="1" vertOverflow="overflow" horzOverflow="overflow" vert="horz" wrap="square" lIns="71437" tIns="71437" rIns="71437" bIns="71437" numCol="1" spcCol="38100" rtlCol="0" anchor="ctr">
+            <a:spAutoFit/>
+          </a:bodyPr>
+          <a:lstStyle/>
+          <a:p>
+            <a:pPr marL="0" marR="0" indent="0" defTabSz="943239" rtl="0" fontAlgn="auto" latinLnBrk="0" hangingPunct="0">
+              <a:lnSpc>
+                <a:spcPct val="100000"/>
+              </a:lnSpc>
+              <a:spcBef>
+                <a:spcPts val="0"/>
+              </a:spcBef>
+              <a:spcAft>
+                <a:spcPts val="0"/>
+              </a:spcAft>
+              <a:buClrTx/>
+              <a:buSzTx/>
+              <a:buFontTx/>
+              <a:buNone/>
+              <a:tabLst/>
+            </a:pPr>
+            <a:r>
+              <a:rPr kumimoji="0" lang="es-CO" sz="9600" b="1" i="0" u="none" strike="noStrike" cap="none" spc="0" normalizeH="0" baseline="0" dirty="0">
+                <a:ln>
+                  <a:noFill/>
+                </a:ln>
+                <a:solidFill>
+                  <a:schemeClr val="bg1">
+                    <a:lumMod val="85000"/>
+                    <a:lumOff val="15000"/>
+                  </a:schemeClr>
+                </a:solidFill>
+                <a:effectLst/>
+                <a:uFillTx/>
+                <a:latin typeface="Calibri" panose="020F0502020204030204" pitchFamily="34" charset="0"/>
+                <a:sym typeface="Helvetica Neue"/>
+              </a:rPr>
               <a:t>Diagrama de clases</a:t>
             </a:r>
           </a:p>
@@ -2859,7 +3129,7 @@
 </p:sld>
 </file>
 
-<file path=ppt/slides/slide11.xml><?xml version="1.0" encoding="utf-8"?>
+<file path=ppt/slides/slide12.xml><?xml version="1.0" encoding="utf-8"?>
 <p:sld xmlns:a="http://schemas.openxmlformats.org/drawingml/2006/main" xmlns:r="http://schemas.openxmlformats.org/officeDocument/2006/relationships" xmlns:p="http://schemas.openxmlformats.org/presentationml/2006/main">
   <p:cSld>
     <p:bg>
@@ -3164,7 +3434,7 @@
 </p:sld>
 </file>
 
-<file path=ppt/slides/slide12.xml><?xml version="1.0" encoding="utf-8"?>
+<file path=ppt/slides/slide13.xml><?xml version="1.0" encoding="utf-8"?>
 <p:sld xmlns:a="http://schemas.openxmlformats.org/drawingml/2006/main" xmlns:r="http://schemas.openxmlformats.org/officeDocument/2006/relationships" xmlns:p="http://schemas.openxmlformats.org/presentationml/2006/main">
   <p:cSld>
     <p:bg>
@@ -3611,7 +3881,7 @@
 </p:sld>
 </file>
 
-<file path=ppt/slides/slide13.xml><?xml version="1.0" encoding="utf-8"?>
+<file path=ppt/slides/slide14.xml><?xml version="1.0" encoding="utf-8"?>
 <p:sld xmlns:a="http://schemas.openxmlformats.org/drawingml/2006/main" xmlns:r="http://schemas.openxmlformats.org/officeDocument/2006/relationships" xmlns:p="http://schemas.openxmlformats.org/presentationml/2006/main">
   <p:cSld>
     <p:bg>
@@ -3880,7 +4150,7 @@
 </p:sld>
 </file>
 
-<file path=ppt/slides/slide14.xml><?xml version="1.0" encoding="utf-8"?>
+<file path=ppt/slides/slide15.xml><?xml version="1.0" encoding="utf-8"?>
 <p:sld xmlns:a="http://schemas.openxmlformats.org/drawingml/2006/main" xmlns:r="http://schemas.openxmlformats.org/officeDocument/2006/relationships" xmlns:p="http://schemas.openxmlformats.org/presentationml/2006/main">
   <p:cSld>
     <p:bg>
@@ -4149,8 +4419,8 @@
 </p:sld>
 </file>
 
-<file path=ppt/slides/slide15.xml><?xml version="1.0" encoding="utf-8"?>
-<p:sld xmlns:a="http://schemas.openxmlformats.org/drawingml/2006/main" xmlns:r="http://schemas.openxmlformats.org/officeDocument/2006/relationships" xmlns:p="http://schemas.openxmlformats.org/presentationml/2006/main">
+<file path=ppt/slides/slide16.xml><?xml version="1.0" encoding="utf-8"?>
+<p:sld xmlns:a="http://schemas.openxmlformats.org/drawingml/2006/main" xmlns:r="http://schemas.openxmlformats.org/officeDocument/2006/relationships" xmlns:p="http://schemas.openxmlformats.org/presentationml/2006/main" show="0">
   <p:cSld>
     <p:bg>
       <p:bgPr>
@@ -4563,8 +4833,8 @@
 </p:sld>
 </file>
 
-<file path=ppt/slides/slide16.xml><?xml version="1.0" encoding="utf-8"?>
-<p:sld xmlns:a="http://schemas.openxmlformats.org/drawingml/2006/main" xmlns:r="http://schemas.openxmlformats.org/officeDocument/2006/relationships" xmlns:p="http://schemas.openxmlformats.org/presentationml/2006/main">
+<file path=ppt/slides/slide17.xml><?xml version="1.0" encoding="utf-8"?>
+<p:sld xmlns:a="http://schemas.openxmlformats.org/drawingml/2006/main" xmlns:r="http://schemas.openxmlformats.org/officeDocument/2006/relationships" xmlns:p="http://schemas.openxmlformats.org/presentationml/2006/main" show="0">
   <p:cSld>
     <p:bg>
       <p:bgPr>
@@ -4871,7 +5141,7 @@
 </p:sld>
 </file>
 
-<file path=ppt/slides/slide17.xml><?xml version="1.0" encoding="utf-8"?>
+<file path=ppt/slides/slide18.xml><?xml version="1.0" encoding="utf-8"?>
 <p:sld xmlns:a="http://schemas.openxmlformats.org/drawingml/2006/main" xmlns:r="http://schemas.openxmlformats.org/officeDocument/2006/relationships" xmlns:p="http://schemas.openxmlformats.org/presentationml/2006/main" show="0">
   <p:cSld>
     <p:bg>
@@ -4951,7 +5221,7 @@
 </p:sld>
 </file>
 
-<file path=ppt/slides/slide18.xml><?xml version="1.0" encoding="utf-8"?>
+<file path=ppt/slides/slide19.xml><?xml version="1.0" encoding="utf-8"?>
 <p:sld xmlns:a="http://schemas.openxmlformats.org/drawingml/2006/main" xmlns:r="http://schemas.openxmlformats.org/officeDocument/2006/relationships" xmlns:p="http://schemas.openxmlformats.org/presentationml/2006/main" show="0">
   <p:cSld>
     <p:bg>
@@ -5031,7 +5301,246 @@
 </p:sld>
 </file>
 
-<file path=ppt/slides/slide19.xml><?xml version="1.0" encoding="utf-8"?>
+<file path=ppt/slides/slide2.xml><?xml version="1.0" encoding="utf-8"?>
+<p:sld xmlns:a="http://schemas.openxmlformats.org/drawingml/2006/main" xmlns:r="http://schemas.openxmlformats.org/officeDocument/2006/relationships" xmlns:p="http://schemas.openxmlformats.org/presentationml/2006/main" show="0">
+  <p:cSld>
+    <p:bg>
+      <p:bgPr>
+        <a:blipFill rotWithShape="1">
+          <a:blip r:embed="rId2"/>
+          <a:stretch>
+            <a:fillRect/>
+          </a:stretch>
+        </a:blipFill>
+        <a:effectLst/>
+      </p:bgPr>
+    </p:bg>
+    <p:spTree>
+      <p:nvGrpSpPr>
+        <p:cNvPr id="1" name=""/>
+        <p:cNvGrpSpPr/>
+        <p:nvPr/>
+      </p:nvGrpSpPr>
+      <p:grpSpPr>
+        <a:xfrm>
+          <a:off x="0" y="0"/>
+          <a:ext cx="0" cy="0"/>
+          <a:chOff x="0" y="0"/>
+          <a:chExt cx="0" cy="0"/>
+        </a:xfrm>
+      </p:grpSpPr>
+      <p:sp>
+        <p:nvSpPr>
+          <p:cNvPr id="2" name="CuadroTexto 1">
+            <a:extLst>
+              <a:ext uri="{FF2B5EF4-FFF2-40B4-BE49-F238E27FC236}">
+                <a16:creationId xmlns:a16="http://schemas.microsoft.com/office/drawing/2014/main" id="{CF0A36C0-2D36-4A57-8F31-2256EA1C80A2}"/>
+              </a:ext>
+            </a:extLst>
+          </p:cNvPr>
+          <p:cNvSpPr txBox="1"/>
+          <p:nvPr/>
+        </p:nvSpPr>
+        <p:spPr>
+          <a:xfrm>
+            <a:off x="2255520" y="2414235"/>
+            <a:ext cx="19872960" cy="1621597"/>
+          </a:xfrm>
+          <a:prstGeom prst="rect">
+            <a:avLst/>
+          </a:prstGeom>
+          <a:noFill/>
+          <a:ln w="12700" cap="flat">
+            <a:noFill/>
+            <a:miter lim="400000"/>
+          </a:ln>
+          <a:effectLst/>
+          <a:sp3d/>
+        </p:spPr>
+        <p:style>
+          <a:lnRef idx="0">
+            <a:scrgbClr r="0" g="0" b="0"/>
+          </a:lnRef>
+          <a:fillRef idx="0">
+            <a:scrgbClr r="0" g="0" b="0"/>
+          </a:fillRef>
+          <a:effectRef idx="0">
+            <a:scrgbClr r="0" g="0" b="0"/>
+          </a:effectRef>
+          <a:fontRef idx="none"/>
+        </p:style>
+        <p:txBody>
+          <a:bodyPr rot="0" spcFirstLastPara="1" vertOverflow="overflow" horzOverflow="overflow" vert="horz" wrap="square" lIns="71437" tIns="71437" rIns="71437" bIns="71437" numCol="1" spcCol="38100" rtlCol="0" anchor="ctr">
+            <a:spAutoFit/>
+          </a:bodyPr>
+          <a:lstStyle/>
+          <a:p>
+            <a:pPr marL="0" marR="0" indent="0" defTabSz="943239" rtl="0" fontAlgn="auto" latinLnBrk="0" hangingPunct="0">
+              <a:lnSpc>
+                <a:spcPct val="100000"/>
+              </a:lnSpc>
+              <a:spcBef>
+                <a:spcPts val="0"/>
+              </a:spcBef>
+              <a:spcAft>
+                <a:spcPts val="0"/>
+              </a:spcAft>
+              <a:buClrTx/>
+              <a:buSzTx/>
+              <a:buFontTx/>
+              <a:buNone/>
+              <a:tabLst/>
+            </a:pPr>
+            <a:r>
+              <a:rPr lang="es-CO" sz="9600" dirty="0">
+                <a:solidFill>
+                  <a:schemeClr val="bg1">
+                    <a:lumMod val="85000"/>
+                    <a:lumOff val="15000"/>
+                  </a:schemeClr>
+                </a:solidFill>
+                <a:latin typeface="Calibri" panose="020F0502020204030204" pitchFamily="34" charset="0"/>
+              </a:rPr>
+              <a:t>Proyecto formativo</a:t>
+            </a:r>
+            <a:endParaRPr kumimoji="0" lang="es-CO" sz="8000" b="1" i="0" u="none" strike="noStrike" cap="none" spc="0" normalizeH="0" baseline="0" dirty="0">
+              <a:ln>
+                <a:noFill/>
+              </a:ln>
+              <a:solidFill>
+                <a:schemeClr val="bg1">
+                  <a:lumMod val="85000"/>
+                  <a:lumOff val="15000"/>
+                </a:schemeClr>
+              </a:solidFill>
+              <a:effectLst/>
+              <a:uFillTx/>
+              <a:latin typeface="Calibri" panose="020F0502020204030204" pitchFamily="34" charset="0"/>
+              <a:sym typeface="Helvetica Neue"/>
+            </a:endParaRPr>
+          </a:p>
+        </p:txBody>
+      </p:sp>
+      <p:sp>
+        <p:nvSpPr>
+          <p:cNvPr id="3" name="CuadroTexto 2">
+            <a:extLst>
+              <a:ext uri="{FF2B5EF4-FFF2-40B4-BE49-F238E27FC236}">
+                <a16:creationId xmlns:a16="http://schemas.microsoft.com/office/drawing/2014/main" id="{AEADB5F6-42D2-4A37-907B-B5EB9A5F9044}"/>
+              </a:ext>
+            </a:extLst>
+          </p:cNvPr>
+          <p:cNvSpPr txBox="1"/>
+          <p:nvPr/>
+        </p:nvSpPr>
+        <p:spPr>
+          <a:xfrm>
+            <a:off x="7131313" y="7063201"/>
+            <a:ext cx="10121373" cy="1621597"/>
+          </a:xfrm>
+          <a:prstGeom prst="rect">
+            <a:avLst/>
+          </a:prstGeom>
+          <a:noFill/>
+          <a:ln w="12700" cap="flat">
+            <a:noFill/>
+            <a:miter lim="400000"/>
+          </a:ln>
+          <a:effectLst/>
+          <a:sp3d/>
+        </p:spPr>
+        <p:style>
+          <a:lnRef idx="0">
+            <a:scrgbClr r="0" g="0" b="0"/>
+          </a:lnRef>
+          <a:fillRef idx="0">
+            <a:scrgbClr r="0" g="0" b="0"/>
+          </a:fillRef>
+          <a:effectRef idx="0">
+            <a:scrgbClr r="0" g="0" b="0"/>
+          </a:effectRef>
+          <a:fontRef idx="none"/>
+        </p:style>
+        <p:txBody>
+          <a:bodyPr rot="0" spcFirstLastPara="1" vertOverflow="overflow" horzOverflow="overflow" vert="horz" wrap="square" lIns="71437" tIns="71437" rIns="71437" bIns="71437" numCol="1" spcCol="38100" rtlCol="0" anchor="ctr">
+            <a:spAutoFit/>
+          </a:bodyPr>
+          <a:lstStyle/>
+          <a:p>
+            <a:r>
+              <a:rPr lang="es-CO" sz="4800" b="0" dirty="0">
+                <a:solidFill>
+                  <a:schemeClr val="bg1">
+                    <a:lumMod val="85000"/>
+                    <a:lumOff val="15000"/>
+                  </a:schemeClr>
+                </a:solidFill>
+                <a:latin typeface="Calibri" panose="020F0502020204030204" pitchFamily="34" charset="0"/>
+              </a:rPr>
+              <a:t>SISTEMA INTEGRAL WEB PARA GESTIÓN DE PROCESOS EDUCATIVOS DEL CEET</a:t>
+            </a:r>
+            <a:endParaRPr lang="es-CO" sz="4800" dirty="0">
+              <a:solidFill>
+                <a:schemeClr val="bg1">
+                  <a:lumMod val="85000"/>
+                  <a:lumOff val="15000"/>
+                </a:schemeClr>
+              </a:solidFill>
+              <a:latin typeface="Calibri" panose="020F0502020204030204" pitchFamily="34" charset="0"/>
+            </a:endParaRPr>
+          </a:p>
+        </p:txBody>
+      </p:sp>
+      <p:pic>
+        <p:nvPicPr>
+          <p:cNvPr id="4" name="Imagen 3">
+            <a:extLst>
+              <a:ext uri="{FF2B5EF4-FFF2-40B4-BE49-F238E27FC236}">
+                <a16:creationId xmlns:a16="http://schemas.microsoft.com/office/drawing/2014/main" id="{BE9F3B65-E650-436E-90B3-2C008EBA790A}"/>
+              </a:ext>
+            </a:extLst>
+          </p:cNvPr>
+          <p:cNvPicPr>
+            <a:picLocks noChangeAspect="1"/>
+          </p:cNvPicPr>
+          <p:nvPr/>
+        </p:nvPicPr>
+        <p:blipFill rotWithShape="1">
+          <a:blip r:embed="rId3">
+            <a:extLst>
+              <a:ext uri="{28A0092B-C50C-407E-A947-70E740481C1C}">
+                <a14:useLocalDpi xmlns:a14="http://schemas.microsoft.com/office/drawing/2010/main" val="0"/>
+              </a:ext>
+            </a:extLst>
+          </a:blip>
+          <a:srcRect l="17941" t="43512" r="11589" b="39825"/>
+          <a:stretch/>
+        </p:blipFill>
+        <p:spPr>
+          <a:xfrm>
+            <a:off x="15727680" y="12210749"/>
+            <a:ext cx="6858000" cy="1621597"/>
+          </a:xfrm>
+          <a:prstGeom prst="rect">
+            <a:avLst/>
+          </a:prstGeom>
+        </p:spPr>
+      </p:pic>
+    </p:spTree>
+    <p:extLst>
+      <p:ext uri="{BB962C8B-B14F-4D97-AF65-F5344CB8AC3E}">
+        <p14:creationId xmlns:p14="http://schemas.microsoft.com/office/powerpoint/2010/main" val="1144514591"/>
+      </p:ext>
+    </p:extLst>
+  </p:cSld>
+  <p:clrMapOvr>
+    <a:masterClrMapping/>
+  </p:clrMapOvr>
+  <p:transition spd="med"/>
+</p:sld>
+</file>
+
+<file path=ppt/slides/slide20.xml><?xml version="1.0" encoding="utf-8"?>
 <p:sld xmlns:a="http://schemas.openxmlformats.org/drawingml/2006/main" xmlns:r="http://schemas.openxmlformats.org/officeDocument/2006/relationships" xmlns:p="http://schemas.openxmlformats.org/presentationml/2006/main">
   <p:cSld>
     <p:bg>
@@ -5169,246 +5678,7 @@
 </p:sld>
 </file>
 
-<file path=ppt/slides/slide2.xml><?xml version="1.0" encoding="utf-8"?>
-<p:sld xmlns:a="http://schemas.openxmlformats.org/drawingml/2006/main" xmlns:r="http://schemas.openxmlformats.org/officeDocument/2006/relationships" xmlns:p="http://schemas.openxmlformats.org/presentationml/2006/main">
-  <p:cSld>
-    <p:bg>
-      <p:bgPr>
-        <a:blipFill rotWithShape="1">
-          <a:blip r:embed="rId2"/>
-          <a:stretch>
-            <a:fillRect/>
-          </a:stretch>
-        </a:blipFill>
-        <a:effectLst/>
-      </p:bgPr>
-    </p:bg>
-    <p:spTree>
-      <p:nvGrpSpPr>
-        <p:cNvPr id="1" name=""/>
-        <p:cNvGrpSpPr/>
-        <p:nvPr/>
-      </p:nvGrpSpPr>
-      <p:grpSpPr>
-        <a:xfrm>
-          <a:off x="0" y="0"/>
-          <a:ext cx="0" cy="0"/>
-          <a:chOff x="0" y="0"/>
-          <a:chExt cx="0" cy="0"/>
-        </a:xfrm>
-      </p:grpSpPr>
-      <p:sp>
-        <p:nvSpPr>
-          <p:cNvPr id="2" name="CuadroTexto 1">
-            <a:extLst>
-              <a:ext uri="{FF2B5EF4-FFF2-40B4-BE49-F238E27FC236}">
-                <a16:creationId xmlns:a16="http://schemas.microsoft.com/office/drawing/2014/main" id="{CF0A36C0-2D36-4A57-8F31-2256EA1C80A2}"/>
-              </a:ext>
-            </a:extLst>
-          </p:cNvPr>
-          <p:cNvSpPr txBox="1"/>
-          <p:nvPr/>
-        </p:nvSpPr>
-        <p:spPr>
-          <a:xfrm>
-            <a:off x="2255520" y="2414235"/>
-            <a:ext cx="19872960" cy="1621597"/>
-          </a:xfrm>
-          <a:prstGeom prst="rect">
-            <a:avLst/>
-          </a:prstGeom>
-          <a:noFill/>
-          <a:ln w="12700" cap="flat">
-            <a:noFill/>
-            <a:miter lim="400000"/>
-          </a:ln>
-          <a:effectLst/>
-          <a:sp3d/>
-        </p:spPr>
-        <p:style>
-          <a:lnRef idx="0">
-            <a:scrgbClr r="0" g="0" b="0"/>
-          </a:lnRef>
-          <a:fillRef idx="0">
-            <a:scrgbClr r="0" g="0" b="0"/>
-          </a:fillRef>
-          <a:effectRef idx="0">
-            <a:scrgbClr r="0" g="0" b="0"/>
-          </a:effectRef>
-          <a:fontRef idx="none"/>
-        </p:style>
-        <p:txBody>
-          <a:bodyPr rot="0" spcFirstLastPara="1" vertOverflow="overflow" horzOverflow="overflow" vert="horz" wrap="square" lIns="71437" tIns="71437" rIns="71437" bIns="71437" numCol="1" spcCol="38100" rtlCol="0" anchor="ctr">
-            <a:spAutoFit/>
-          </a:bodyPr>
-          <a:lstStyle/>
-          <a:p>
-            <a:pPr marL="0" marR="0" indent="0" defTabSz="943239" rtl="0" fontAlgn="auto" latinLnBrk="0" hangingPunct="0">
-              <a:lnSpc>
-                <a:spcPct val="100000"/>
-              </a:lnSpc>
-              <a:spcBef>
-                <a:spcPts val="0"/>
-              </a:spcBef>
-              <a:spcAft>
-                <a:spcPts val="0"/>
-              </a:spcAft>
-              <a:buClrTx/>
-              <a:buSzTx/>
-              <a:buFontTx/>
-              <a:buNone/>
-              <a:tabLst/>
-            </a:pPr>
-            <a:r>
-              <a:rPr lang="es-CO" sz="9600" dirty="0">
-                <a:solidFill>
-                  <a:schemeClr val="bg1">
-                    <a:lumMod val="85000"/>
-                    <a:lumOff val="15000"/>
-                  </a:schemeClr>
-                </a:solidFill>
-                <a:latin typeface="Calibri" panose="020F0502020204030204" pitchFamily="34" charset="0"/>
-              </a:rPr>
-              <a:t>Proyecto formativo</a:t>
-            </a:r>
-            <a:endParaRPr kumimoji="0" lang="es-CO" sz="8000" b="1" i="0" u="none" strike="noStrike" cap="none" spc="0" normalizeH="0" baseline="0" dirty="0">
-              <a:ln>
-                <a:noFill/>
-              </a:ln>
-              <a:solidFill>
-                <a:schemeClr val="bg1">
-                  <a:lumMod val="85000"/>
-                  <a:lumOff val="15000"/>
-                </a:schemeClr>
-              </a:solidFill>
-              <a:effectLst/>
-              <a:uFillTx/>
-              <a:latin typeface="Calibri" panose="020F0502020204030204" pitchFamily="34" charset="0"/>
-              <a:sym typeface="Helvetica Neue"/>
-            </a:endParaRPr>
-          </a:p>
-        </p:txBody>
-      </p:sp>
-      <p:sp>
-        <p:nvSpPr>
-          <p:cNvPr id="3" name="CuadroTexto 2">
-            <a:extLst>
-              <a:ext uri="{FF2B5EF4-FFF2-40B4-BE49-F238E27FC236}">
-                <a16:creationId xmlns:a16="http://schemas.microsoft.com/office/drawing/2014/main" id="{AEADB5F6-42D2-4A37-907B-B5EB9A5F9044}"/>
-              </a:ext>
-            </a:extLst>
-          </p:cNvPr>
-          <p:cNvSpPr txBox="1"/>
-          <p:nvPr/>
-        </p:nvSpPr>
-        <p:spPr>
-          <a:xfrm>
-            <a:off x="7131313" y="7063201"/>
-            <a:ext cx="10121373" cy="1621597"/>
-          </a:xfrm>
-          <a:prstGeom prst="rect">
-            <a:avLst/>
-          </a:prstGeom>
-          <a:noFill/>
-          <a:ln w="12700" cap="flat">
-            <a:noFill/>
-            <a:miter lim="400000"/>
-          </a:ln>
-          <a:effectLst/>
-          <a:sp3d/>
-        </p:spPr>
-        <p:style>
-          <a:lnRef idx="0">
-            <a:scrgbClr r="0" g="0" b="0"/>
-          </a:lnRef>
-          <a:fillRef idx="0">
-            <a:scrgbClr r="0" g="0" b="0"/>
-          </a:fillRef>
-          <a:effectRef idx="0">
-            <a:scrgbClr r="0" g="0" b="0"/>
-          </a:effectRef>
-          <a:fontRef idx="none"/>
-        </p:style>
-        <p:txBody>
-          <a:bodyPr rot="0" spcFirstLastPara="1" vertOverflow="overflow" horzOverflow="overflow" vert="horz" wrap="square" lIns="71437" tIns="71437" rIns="71437" bIns="71437" numCol="1" spcCol="38100" rtlCol="0" anchor="ctr">
-            <a:spAutoFit/>
-          </a:bodyPr>
-          <a:lstStyle/>
-          <a:p>
-            <a:r>
-              <a:rPr lang="es-CO" sz="4800" b="0" dirty="0">
-                <a:solidFill>
-                  <a:schemeClr val="bg1">
-                    <a:lumMod val="85000"/>
-                    <a:lumOff val="15000"/>
-                  </a:schemeClr>
-                </a:solidFill>
-                <a:latin typeface="Calibri" panose="020F0502020204030204" pitchFamily="34" charset="0"/>
-              </a:rPr>
-              <a:t>SISTEMA INTEGRAL WEB PARA GESTIÓN DE PROCESOS EDUCATIVOS DEL CEET</a:t>
-            </a:r>
-            <a:endParaRPr lang="es-CO" sz="4800" dirty="0">
-              <a:solidFill>
-                <a:schemeClr val="bg1">
-                  <a:lumMod val="85000"/>
-                  <a:lumOff val="15000"/>
-                </a:schemeClr>
-              </a:solidFill>
-              <a:latin typeface="Calibri" panose="020F0502020204030204" pitchFamily="34" charset="0"/>
-            </a:endParaRPr>
-          </a:p>
-        </p:txBody>
-      </p:sp>
-      <p:pic>
-        <p:nvPicPr>
-          <p:cNvPr id="4" name="Imagen 3">
-            <a:extLst>
-              <a:ext uri="{FF2B5EF4-FFF2-40B4-BE49-F238E27FC236}">
-                <a16:creationId xmlns:a16="http://schemas.microsoft.com/office/drawing/2014/main" id="{BE9F3B65-E650-436E-90B3-2C008EBA790A}"/>
-              </a:ext>
-            </a:extLst>
-          </p:cNvPr>
-          <p:cNvPicPr>
-            <a:picLocks noChangeAspect="1"/>
-          </p:cNvPicPr>
-          <p:nvPr/>
-        </p:nvPicPr>
-        <p:blipFill rotWithShape="1">
-          <a:blip r:embed="rId3">
-            <a:extLst>
-              <a:ext uri="{28A0092B-C50C-407E-A947-70E740481C1C}">
-                <a14:useLocalDpi xmlns:a14="http://schemas.microsoft.com/office/drawing/2010/main" val="0"/>
-              </a:ext>
-            </a:extLst>
-          </a:blip>
-          <a:srcRect l="17941" t="43512" r="11589" b="39825"/>
-          <a:stretch/>
-        </p:blipFill>
-        <p:spPr>
-          <a:xfrm>
-            <a:off x="15727680" y="12210749"/>
-            <a:ext cx="6858000" cy="1621597"/>
-          </a:xfrm>
-          <a:prstGeom prst="rect">
-            <a:avLst/>
-          </a:prstGeom>
-        </p:spPr>
-      </p:pic>
-    </p:spTree>
-    <p:extLst>
-      <p:ext uri="{BB962C8B-B14F-4D97-AF65-F5344CB8AC3E}">
-        <p14:creationId xmlns:p14="http://schemas.microsoft.com/office/powerpoint/2010/main" val="1144514591"/>
-      </p:ext>
-    </p:extLst>
-  </p:cSld>
-  <p:clrMapOvr>
-    <a:masterClrMapping/>
-  </p:clrMapOvr>
-  <p:transition spd="med"/>
-</p:sld>
-</file>
-
-<file path=ppt/slides/slide20.xml><?xml version="1.0" encoding="utf-8"?>
+<file path=ppt/slides/slide21.xml><?xml version="1.0" encoding="utf-8"?>
 <p:sld xmlns:a="http://schemas.openxmlformats.org/drawingml/2006/main" xmlns:r="http://schemas.openxmlformats.org/officeDocument/2006/relationships" xmlns:p="http://schemas.openxmlformats.org/presentationml/2006/main" show="0">
   <p:cSld>
     <p:bg>
@@ -5686,8 +5956,8 @@
         </p:nvSpPr>
         <p:spPr>
           <a:xfrm>
-            <a:off x="3961896" y="4459371"/>
-            <a:ext cx="13960847" cy="8146460"/>
+            <a:off x="3961896" y="5690476"/>
+            <a:ext cx="13960847" cy="5684247"/>
           </a:xfrm>
           <a:prstGeom prst="rect">
             <a:avLst/>
@@ -5748,41 +6018,7 @@
                   </a:schemeClr>
                 </a:solidFill>
               </a:rPr>
-              <a:t>Proyecto formativo</a:t>
-            </a:r>
-          </a:p>
-          <a:p>
-            <a:pPr marL="914400" lvl="2" indent="-914400" algn="l">
-              <a:buFont typeface="+mj-lt"/>
-              <a:buAutoNum type="arabicPeriod"/>
-            </a:pPr>
-            <a:r>
-              <a:rPr lang="es-CO" sz="4000" dirty="0">
-                <a:solidFill>
-                  <a:schemeClr val="bg1">
-                    <a:lumMod val="85000"/>
-                    <a:lumOff val="15000"/>
-                  </a:schemeClr>
-                </a:solidFill>
-              </a:rPr>
-              <a:t>Objetivo general y problema</a:t>
-            </a:r>
-          </a:p>
-          <a:p>
-            <a:pPr marL="914400" lvl="2" indent="-914400" algn="l">
-              <a:buFont typeface="+mj-lt"/>
-              <a:buAutoNum type="arabicPeriod"/>
-            </a:pPr>
-            <a:r>
-              <a:rPr lang="es-CO" sz="4000" dirty="0">
-                <a:solidFill>
-                  <a:schemeClr val="bg1">
-                    <a:lumMod val="85000"/>
-                    <a:lumOff val="15000"/>
-                  </a:schemeClr>
-                </a:solidFill>
-              </a:rPr>
-              <a:t>Documento IEEE830</a:t>
+              <a:t>Objetivo general , problema y alcance</a:t>
             </a:r>
           </a:p>
           <a:p>
@@ -5902,40 +6138,6 @@
                 </a:solidFill>
               </a:rPr>
               <a:t>Prototipos</a:t>
-            </a:r>
-          </a:p>
-          <a:p>
-            <a:pPr marL="914400" lvl="2" indent="-914400" algn="l">
-              <a:buFont typeface="+mj-lt"/>
-              <a:buAutoNum type="arabicPeriod"/>
-            </a:pPr>
-            <a:r>
-              <a:rPr lang="es-CO" sz="4000" dirty="0">
-                <a:solidFill>
-                  <a:schemeClr val="bg1">
-                    <a:lumMod val="85000"/>
-                    <a:lumOff val="15000"/>
-                  </a:schemeClr>
-                </a:solidFill>
-              </a:rPr>
-              <a:t>Casos de uso</a:t>
-            </a:r>
-          </a:p>
-          <a:p>
-            <a:pPr marL="914400" lvl="2" indent="-914400" algn="l">
-              <a:buFont typeface="+mj-lt"/>
-              <a:buAutoNum type="arabicPeriod"/>
-            </a:pPr>
-            <a:r>
-              <a:rPr lang="es-CO" sz="4000" dirty="0">
-                <a:solidFill>
-                  <a:schemeClr val="bg1">
-                    <a:lumMod val="85000"/>
-                    <a:lumOff val="15000"/>
-                  </a:schemeClr>
-                </a:solidFill>
-              </a:rPr>
-              <a:t>Control de versiones</a:t>
             </a:r>
           </a:p>
         </p:txBody>
@@ -6218,25 +6420,7 @@
                 </a:solidFill>
                 <a:latin typeface="Calibri" panose="020F0502020204030204" pitchFamily="34" charset="0"/>
               </a:rPr>
-              <a:t>Desarrollar una plataforma fácil e intuitiva para la gestión de la asistencia a las clases con el fin de que cualquier persona pueda hacer uso de esta y optimizar los tiempos de gestión de asistencia, haciendo uso de técnicas de diseño </a:t>
-            </a:r>
-            <a:r>
-              <a:rPr lang="es-CO" sz="5400" b="0" dirty="0" err="1">
-                <a:solidFill>
-                  <a:srgbClr val="212121"/>
-                </a:solidFill>
-                <a:latin typeface="Calibri" panose="020F0502020204030204" pitchFamily="34" charset="0"/>
-              </a:rPr>
-              <a:t>ux</a:t>
-            </a:r>
-            <a:r>
-              <a:rPr lang="es-CO" sz="5400" b="0" dirty="0">
-                <a:solidFill>
-                  <a:srgbClr val="212121"/>
-                </a:solidFill>
-                <a:latin typeface="Calibri" panose="020F0502020204030204" pitchFamily="34" charset="0"/>
-              </a:rPr>
-              <a:t> y explicaciones virtuales. </a:t>
+              <a:t>Desarrollar una plataforma fácil e intuitiva para la gestión de la asistencia a las clases con el fin de que cualquier persona pueda hacer uso de esta y optimizar los tiempos de gestión de asistencia, haciendo uso de técnicas de diseño ux y explicaciones virtuales. </a:t>
             </a:r>
             <a:endParaRPr lang="es-CO" sz="5400" dirty="0">
               <a:latin typeface="Calibri" panose="020F0502020204030204" pitchFamily="34" charset="0"/>
@@ -6406,6 +6590,208 @@
       </p:grpSpPr>
       <p:sp>
         <p:nvSpPr>
+          <p:cNvPr id="3" name="Rectángulo 2">
+            <a:extLst>
+              <a:ext uri="{FF2B5EF4-FFF2-40B4-BE49-F238E27FC236}">
+                <a16:creationId xmlns:a16="http://schemas.microsoft.com/office/drawing/2014/main" id="{34F5A4A4-3778-42B0-9880-CD7D26B83A13}"/>
+              </a:ext>
+            </a:extLst>
+          </p:cNvPr>
+          <p:cNvSpPr/>
+          <p:nvPr/>
+        </p:nvSpPr>
+        <p:spPr>
+          <a:xfrm>
+            <a:off x="5349240" y="4171189"/>
+            <a:ext cx="13685520" cy="8402300"/>
+          </a:xfrm>
+          <a:prstGeom prst="rect">
+            <a:avLst/>
+          </a:prstGeom>
+        </p:spPr>
+        <p:txBody>
+          <a:bodyPr wrap="square">
+            <a:spAutoFit/>
+          </a:bodyPr>
+          <a:lstStyle/>
+          <a:p>
+            <a:r>
+              <a:rPr lang="es-CO" sz="5400" b="0" dirty="0">
+                <a:solidFill>
+                  <a:srgbClr val="212121"/>
+                </a:solidFill>
+                <a:latin typeface="Calibri" panose="020F0502020204030204" pitchFamily="34" charset="0"/>
+              </a:rPr>
+              <a:t>Este proyecto tomara en cuenta la población estudiantil del SENA, la cual directamente se refiere a aprendiz e instructor. Se pretende realizar un software que ayude, facilite y ahorre tiempo en lo que se comprende como la gestión de asistencias, el cual tomara opiniones una pequeña parte de la población y así mismo va dirigido directamente a la población ya descrita, funcionara ya sea en modo de clases presenciales o virtuales.</a:t>
+            </a:r>
+            <a:endParaRPr lang="es-CO" sz="5400" dirty="0">
+              <a:latin typeface="Calibri" panose="020F0502020204030204" pitchFamily="34" charset="0"/>
+            </a:endParaRPr>
+          </a:p>
+        </p:txBody>
+      </p:sp>
+      <p:sp>
+        <p:nvSpPr>
+          <p:cNvPr id="4" name="CuadroTexto 3">
+            <a:extLst>
+              <a:ext uri="{FF2B5EF4-FFF2-40B4-BE49-F238E27FC236}">
+                <a16:creationId xmlns:a16="http://schemas.microsoft.com/office/drawing/2014/main" id="{E70D116D-4829-46A5-B389-0E74C0C48284}"/>
+              </a:ext>
+            </a:extLst>
+          </p:cNvPr>
+          <p:cNvSpPr txBox="1"/>
+          <p:nvPr/>
+        </p:nvSpPr>
+        <p:spPr>
+          <a:xfrm>
+            <a:off x="2255520" y="2414235"/>
+            <a:ext cx="19872960" cy="1621597"/>
+          </a:xfrm>
+          <a:prstGeom prst="rect">
+            <a:avLst/>
+          </a:prstGeom>
+          <a:noFill/>
+          <a:ln w="12700" cap="flat">
+            <a:noFill/>
+            <a:miter lim="400000"/>
+          </a:ln>
+          <a:effectLst/>
+          <a:sp3d/>
+        </p:spPr>
+        <p:style>
+          <a:lnRef idx="0">
+            <a:scrgbClr r="0" g="0" b="0"/>
+          </a:lnRef>
+          <a:fillRef idx="0">
+            <a:scrgbClr r="0" g="0" b="0"/>
+          </a:fillRef>
+          <a:effectRef idx="0">
+            <a:scrgbClr r="0" g="0" b="0"/>
+          </a:effectRef>
+          <a:fontRef idx="none"/>
+        </p:style>
+        <p:txBody>
+          <a:bodyPr rot="0" spcFirstLastPara="1" vertOverflow="overflow" horzOverflow="overflow" vert="horz" wrap="square" lIns="71437" tIns="71437" rIns="71437" bIns="71437" numCol="1" spcCol="38100" rtlCol="0" anchor="ctr">
+            <a:spAutoFit/>
+          </a:bodyPr>
+          <a:lstStyle/>
+          <a:p>
+            <a:pPr marL="0" marR="0" indent="0" defTabSz="943239" rtl="0" fontAlgn="auto" latinLnBrk="0" hangingPunct="0">
+              <a:lnSpc>
+                <a:spcPct val="100000"/>
+              </a:lnSpc>
+              <a:spcBef>
+                <a:spcPts val="0"/>
+              </a:spcBef>
+              <a:spcAft>
+                <a:spcPts val="0"/>
+              </a:spcAft>
+              <a:buClrTx/>
+              <a:buSzTx/>
+              <a:buFontTx/>
+              <a:buNone/>
+              <a:tabLst/>
+            </a:pPr>
+            <a:r>
+              <a:rPr kumimoji="0" lang="es-CO" sz="9600" b="1" i="0" u="none" strike="noStrike" cap="none" spc="0" normalizeH="0" baseline="0" dirty="0">
+                <a:ln>
+                  <a:noFill/>
+                </a:ln>
+                <a:solidFill>
+                  <a:schemeClr val="bg1">
+                    <a:lumMod val="85000"/>
+                    <a:lumOff val="15000"/>
+                  </a:schemeClr>
+                </a:solidFill>
+                <a:effectLst/>
+                <a:uFillTx/>
+                <a:latin typeface="Calibri" panose="020F0502020204030204" pitchFamily="34" charset="0"/>
+                <a:sym typeface="Helvetica Neue"/>
+              </a:rPr>
+              <a:t>Alcance</a:t>
+            </a:r>
+          </a:p>
+        </p:txBody>
+      </p:sp>
+      <p:pic>
+        <p:nvPicPr>
+          <p:cNvPr id="5" name="Imagen 4">
+            <a:extLst>
+              <a:ext uri="{FF2B5EF4-FFF2-40B4-BE49-F238E27FC236}">
+                <a16:creationId xmlns:a16="http://schemas.microsoft.com/office/drawing/2014/main" id="{C7437D0E-F2DE-4964-A3B3-DF33A2E75AFD}"/>
+              </a:ext>
+            </a:extLst>
+          </p:cNvPr>
+          <p:cNvPicPr>
+            <a:picLocks noChangeAspect="1"/>
+          </p:cNvPicPr>
+          <p:nvPr/>
+        </p:nvPicPr>
+        <p:blipFill rotWithShape="1">
+          <a:blip r:embed="rId3">
+            <a:extLst>
+              <a:ext uri="{28A0092B-C50C-407E-A947-70E740481C1C}">
+                <a14:useLocalDpi xmlns:a14="http://schemas.microsoft.com/office/drawing/2010/main" val="0"/>
+              </a:ext>
+            </a:extLst>
+          </a:blip>
+          <a:srcRect l="17941" t="43512" r="11589" b="39825"/>
+          <a:stretch/>
+        </p:blipFill>
+        <p:spPr>
+          <a:xfrm>
+            <a:off x="15727680" y="12210749"/>
+            <a:ext cx="6858000" cy="1621597"/>
+          </a:xfrm>
+          <a:prstGeom prst="rect">
+            <a:avLst/>
+          </a:prstGeom>
+        </p:spPr>
+      </p:pic>
+    </p:spTree>
+    <p:extLst>
+      <p:ext uri="{BB962C8B-B14F-4D97-AF65-F5344CB8AC3E}">
+        <p14:creationId xmlns:p14="http://schemas.microsoft.com/office/powerpoint/2010/main" val="3510161304"/>
+      </p:ext>
+    </p:extLst>
+  </p:cSld>
+  <p:clrMapOvr>
+    <a:masterClrMapping/>
+  </p:clrMapOvr>
+  <p:transition spd="med"/>
+</p:sld>
+</file>
+
+<file path=ppt/slides/slide7.xml><?xml version="1.0" encoding="utf-8"?>
+<p:sld xmlns:a="http://schemas.openxmlformats.org/drawingml/2006/main" xmlns:r="http://schemas.openxmlformats.org/officeDocument/2006/relationships" xmlns:p="http://schemas.openxmlformats.org/presentationml/2006/main" show="0">
+  <p:cSld>
+    <p:bg>
+      <p:bgPr>
+        <a:blipFill rotWithShape="1">
+          <a:blip r:embed="rId2"/>
+          <a:stretch>
+            <a:fillRect/>
+          </a:stretch>
+        </a:blipFill>
+        <a:effectLst/>
+      </p:bgPr>
+    </p:bg>
+    <p:spTree>
+      <p:nvGrpSpPr>
+        <p:cNvPr id="1" name=""/>
+        <p:cNvGrpSpPr/>
+        <p:nvPr/>
+      </p:nvGrpSpPr>
+      <p:grpSpPr>
+        <a:xfrm>
+          <a:off x="0" y="0"/>
+          <a:ext cx="0" cy="0"/>
+          <a:chOff x="0" y="0"/>
+          <a:chExt cx="0" cy="0"/>
+        </a:xfrm>
+      </p:grpSpPr>
+      <p:sp>
+        <p:nvSpPr>
           <p:cNvPr id="6" name="CuadroTexto 5">
             <a:extLst>
               <a:ext uri="{FF2B5EF4-FFF2-40B4-BE49-F238E27FC236}">
@@ -6418,7 +6804,7 @@
         </p:nvSpPr>
         <p:spPr>
           <a:xfrm>
-            <a:off x="2255520" y="2414235"/>
+            <a:off x="2255520" y="2261835"/>
             <a:ext cx="19872960" cy="1621597"/>
           </a:xfrm>
           <a:prstGeom prst="rect">
@@ -6645,7 +7031,7 @@
 </p:sld>
 </file>
 
-<file path=ppt/slides/slide7.xml><?xml version="1.0" encoding="utf-8"?>
+<file path=ppt/slides/slide8.xml><?xml version="1.0" encoding="utf-8"?>
 <p:sld xmlns:a="http://schemas.openxmlformats.org/drawingml/2006/main" xmlns:r="http://schemas.openxmlformats.org/officeDocument/2006/relationships" xmlns:p="http://schemas.openxmlformats.org/presentationml/2006/main">
   <p:cSld>
     <p:bg>
@@ -6950,7 +7336,7 @@
 </p:sld>
 </file>
 
-<file path=ppt/slides/slide8.xml><?xml version="1.0" encoding="utf-8"?>
+<file path=ppt/slides/slide9.xml><?xml version="1.0" encoding="utf-8"?>
 <p:sld xmlns:a="http://schemas.openxmlformats.org/drawingml/2006/main" xmlns:r="http://schemas.openxmlformats.org/officeDocument/2006/relationships" xmlns:p="http://schemas.openxmlformats.org/presentationml/2006/main">
   <p:cSld>
     <p:bg>
@@ -7245,275 +7631,6 @@
     <p:extLst>
       <p:ext uri="{BB962C8B-B14F-4D97-AF65-F5344CB8AC3E}">
         <p14:creationId xmlns:p14="http://schemas.microsoft.com/office/powerpoint/2010/main" val="2384271298"/>
-      </p:ext>
-    </p:extLst>
-  </p:cSld>
-  <p:clrMapOvr>
-    <a:masterClrMapping/>
-  </p:clrMapOvr>
-  <p:transition spd="med"/>
-</p:sld>
-</file>
-
-<file path=ppt/slides/slide9.xml><?xml version="1.0" encoding="utf-8"?>
-<p:sld xmlns:a="http://schemas.openxmlformats.org/drawingml/2006/main" xmlns:r="http://schemas.openxmlformats.org/officeDocument/2006/relationships" xmlns:p="http://schemas.openxmlformats.org/presentationml/2006/main">
-  <p:cSld>
-    <p:bg>
-      <p:bgPr>
-        <a:blipFill rotWithShape="1">
-          <a:blip r:embed="rId2"/>
-          <a:stretch>
-            <a:fillRect/>
-          </a:stretch>
-        </a:blipFill>
-        <a:effectLst/>
-      </p:bgPr>
-    </p:bg>
-    <p:spTree>
-      <p:nvGrpSpPr>
-        <p:cNvPr id="1" name=""/>
-        <p:cNvGrpSpPr/>
-        <p:nvPr/>
-      </p:nvGrpSpPr>
-      <p:grpSpPr>
-        <a:xfrm>
-          <a:off x="0" y="0"/>
-          <a:ext cx="0" cy="0"/>
-          <a:chOff x="0" y="0"/>
-          <a:chExt cx="0" cy="0"/>
-        </a:xfrm>
-      </p:grpSpPr>
-      <p:sp>
-        <p:nvSpPr>
-          <p:cNvPr id="2" name="CuadroTexto 1">
-            <a:extLst>
-              <a:ext uri="{FF2B5EF4-FFF2-40B4-BE49-F238E27FC236}">
-                <a16:creationId xmlns:a16="http://schemas.microsoft.com/office/drawing/2014/main" id="{A3132D1F-2B09-4536-8066-2A4F375B9D21}"/>
-              </a:ext>
-            </a:extLst>
-          </p:cNvPr>
-          <p:cNvSpPr txBox="1"/>
-          <p:nvPr/>
-        </p:nvSpPr>
-        <p:spPr>
-          <a:xfrm>
-            <a:off x="2255520" y="2414235"/>
-            <a:ext cx="19872960" cy="1621597"/>
-          </a:xfrm>
-          <a:prstGeom prst="rect">
-            <a:avLst/>
-          </a:prstGeom>
-          <a:noFill/>
-          <a:ln w="12700" cap="flat">
-            <a:noFill/>
-            <a:miter lim="400000"/>
-          </a:ln>
-          <a:effectLst/>
-          <a:sp3d/>
-        </p:spPr>
-        <p:style>
-          <a:lnRef idx="0">
-            <a:scrgbClr r="0" g="0" b="0"/>
-          </a:lnRef>
-          <a:fillRef idx="0">
-            <a:scrgbClr r="0" g="0" b="0"/>
-          </a:fillRef>
-          <a:effectRef idx="0">
-            <a:scrgbClr r="0" g="0" b="0"/>
-          </a:effectRef>
-          <a:fontRef idx="none"/>
-        </p:style>
-        <p:txBody>
-          <a:bodyPr rot="0" spcFirstLastPara="1" vertOverflow="overflow" horzOverflow="overflow" vert="horz" wrap="square" lIns="71437" tIns="71437" rIns="71437" bIns="71437" numCol="1" spcCol="38100" rtlCol="0" anchor="ctr">
-            <a:spAutoFit/>
-          </a:bodyPr>
-          <a:lstStyle/>
-          <a:p>
-            <a:pPr marL="0" marR="0" indent="0" defTabSz="943239" rtl="0" fontAlgn="auto" latinLnBrk="0" hangingPunct="0">
-              <a:lnSpc>
-                <a:spcPct val="100000"/>
-              </a:lnSpc>
-              <a:spcBef>
-                <a:spcPts val="0"/>
-              </a:spcBef>
-              <a:spcAft>
-                <a:spcPts val="0"/>
-              </a:spcAft>
-              <a:buClrTx/>
-              <a:buSzTx/>
-              <a:buFontTx/>
-              <a:buNone/>
-              <a:tabLst/>
-            </a:pPr>
-            <a:r>
-              <a:rPr kumimoji="0" lang="es-CO" sz="9600" b="1" i="0" u="none" strike="noStrike" cap="none" spc="0" normalizeH="0" baseline="0" dirty="0">
-                <a:ln>
-                  <a:noFill/>
-                </a:ln>
-                <a:solidFill>
-                  <a:schemeClr val="bg1">
-                    <a:lumMod val="85000"/>
-                    <a:lumOff val="15000"/>
-                  </a:schemeClr>
-                </a:solidFill>
-                <a:effectLst/>
-                <a:uFillTx/>
-                <a:latin typeface="Calibri" panose="020F0502020204030204" pitchFamily="34" charset="0"/>
-                <a:sym typeface="Helvetica Neue"/>
-              </a:rPr>
-              <a:t>Diccionario de datos</a:t>
-            </a:r>
-          </a:p>
-        </p:txBody>
-      </p:sp>
-      <p:sp>
-        <p:nvSpPr>
-          <p:cNvPr id="5" name="CuadroTexto 4">
-            <a:extLst>
-              <a:ext uri="{FF2B5EF4-FFF2-40B4-BE49-F238E27FC236}">
-                <a16:creationId xmlns:a16="http://schemas.microsoft.com/office/drawing/2014/main" id="{770693C3-94C8-4AFE-AC3D-15002080B156}"/>
-              </a:ext>
-            </a:extLst>
-          </p:cNvPr>
-          <p:cNvSpPr txBox="1"/>
-          <p:nvPr/>
-        </p:nvSpPr>
-        <p:spPr>
-          <a:xfrm>
-            <a:off x="9490940" y="7175733"/>
-            <a:ext cx="5402120" cy="698267"/>
-          </a:xfrm>
-          <a:prstGeom prst="rect">
-            <a:avLst/>
-          </a:prstGeom>
-          <a:noFill/>
-          <a:ln w="12700" cap="flat">
-            <a:noFill/>
-            <a:miter lim="400000"/>
-          </a:ln>
-          <a:effectLst/>
-          <a:sp3d/>
-        </p:spPr>
-        <p:style>
-          <a:lnRef idx="0">
-            <a:scrgbClr r="0" g="0" b="0"/>
-          </a:lnRef>
-          <a:fillRef idx="0">
-            <a:scrgbClr r="0" g="0" b="0"/>
-          </a:fillRef>
-          <a:effectRef idx="0">
-            <a:scrgbClr r="0" g="0" b="0"/>
-          </a:effectRef>
-          <a:fontRef idx="none"/>
-        </p:style>
-        <p:txBody>
-          <a:bodyPr rot="0" spcFirstLastPara="1" vertOverflow="overflow" horzOverflow="overflow" vert="horz" wrap="none" lIns="71437" tIns="71437" rIns="71437" bIns="71437" numCol="1" spcCol="38100" rtlCol="0" anchor="ctr">
-            <a:spAutoFit/>
-          </a:bodyPr>
-          <a:lstStyle/>
-          <a:p>
-            <a:pPr marL="0" marR="0" indent="0" algn="ctr" defTabSz="943239" rtl="0" fontAlgn="auto" latinLnBrk="0" hangingPunct="0">
-              <a:lnSpc>
-                <a:spcPct val="100000"/>
-              </a:lnSpc>
-              <a:spcBef>
-                <a:spcPts val="0"/>
-              </a:spcBef>
-              <a:spcAft>
-                <a:spcPts val="0"/>
-              </a:spcAft>
-              <a:buClrTx/>
-              <a:buSzTx/>
-              <a:buFontTx/>
-              <a:buNone/>
-              <a:tabLst/>
-            </a:pPr>
-            <a:r>
-              <a:rPr kumimoji="0" lang="es-CO" sz="3600" i="0" strike="noStrike" cap="none" spc="0" normalizeH="0" baseline="0" dirty="0">
-                <a:ln>
-                  <a:noFill/>
-                </a:ln>
-                <a:solidFill>
-                  <a:schemeClr val="bg1">
-                    <a:lumMod val="85000"/>
-                    <a:lumOff val="15000"/>
-                  </a:schemeClr>
-                </a:solidFill>
-                <a:effectLst/>
-                <a:uFillTx/>
-                <a:latin typeface="Helvetica Neue"/>
-                <a:ea typeface="Helvetica Neue"/>
-                <a:cs typeface="Helvetica Neue"/>
-                <a:sym typeface="Helvetica Neue"/>
-                <a:hlinkClick r:id="rId3" action="ppaction://hlinkfile">
-                  <a:extLst>
-                    <a:ext uri="{A12FA001-AC4F-418D-AE19-62706E023703}">
-                      <ahyp:hlinkClr xmlns:ahyp="http://schemas.microsoft.com/office/drawing/2018/hyperlinkcolor" val="tx"/>
-                    </a:ext>
-                  </a:extLst>
-                </a:hlinkClick>
-              </a:rPr>
-              <a:t>Click para abrir archivo.</a:t>
-            </a:r>
-            <a:endParaRPr kumimoji="0" lang="es-CO" sz="3600" i="0" strike="noStrike" cap="none" spc="0" normalizeH="0" baseline="0" dirty="0">
-              <a:ln>
-                <a:noFill/>
-              </a:ln>
-              <a:solidFill>
-                <a:schemeClr val="bg1">
-                  <a:lumMod val="85000"/>
-                  <a:lumOff val="15000"/>
-                </a:schemeClr>
-              </a:solidFill>
-              <a:effectLst/>
-              <a:uFillTx/>
-              <a:latin typeface="Helvetica Neue"/>
-              <a:ea typeface="Helvetica Neue"/>
-              <a:cs typeface="Helvetica Neue"/>
-              <a:sym typeface="Helvetica Neue"/>
-            </a:endParaRPr>
-          </a:p>
-        </p:txBody>
-      </p:sp>
-      <p:pic>
-        <p:nvPicPr>
-          <p:cNvPr id="4" name="Imagen 3">
-            <a:extLst>
-              <a:ext uri="{FF2B5EF4-FFF2-40B4-BE49-F238E27FC236}">
-                <a16:creationId xmlns:a16="http://schemas.microsoft.com/office/drawing/2014/main" id="{95C30589-D84F-43B0-861B-615AC36DED96}"/>
-              </a:ext>
-            </a:extLst>
-          </p:cNvPr>
-          <p:cNvPicPr>
-            <a:picLocks noChangeAspect="1"/>
-          </p:cNvPicPr>
-          <p:nvPr/>
-        </p:nvPicPr>
-        <p:blipFill rotWithShape="1">
-          <a:blip r:embed="rId4">
-            <a:extLst>
-              <a:ext uri="{28A0092B-C50C-407E-A947-70E740481C1C}">
-                <a14:useLocalDpi xmlns:a14="http://schemas.microsoft.com/office/drawing/2010/main" val="0"/>
-              </a:ext>
-            </a:extLst>
-          </a:blip>
-          <a:srcRect l="17941" t="43512" r="11589" b="39825"/>
-          <a:stretch/>
-        </p:blipFill>
-        <p:spPr>
-          <a:xfrm>
-            <a:off x="15727680" y="12210749"/>
-            <a:ext cx="6858000" cy="1621597"/>
-          </a:xfrm>
-          <a:prstGeom prst="rect">
-            <a:avLst/>
-          </a:prstGeom>
-        </p:spPr>
-      </p:pic>
-    </p:spTree>
-    <p:extLst>
-      <p:ext uri="{BB962C8B-B14F-4D97-AF65-F5344CB8AC3E}">
-        <p14:creationId xmlns:p14="http://schemas.microsoft.com/office/powerpoint/2010/main" val="2018473659"/>
       </p:ext>
     </p:extLst>
   </p:cSld>

</xml_diff>